<commit_message>
Corrected error in figure
</commit_message>
<xml_diff>
--- a/figures/Chapter 4 - Introduction to Graph Theory/4.3_4.4 Algorithms on Graphs - BFS_DFS.pptx
+++ b/figures/Chapter 4 - Introduction to Graph Theory/4.3_4.4 Algorithms on Graphs - BFS_DFS.pptx
@@ -168,10 +168,9 @@
           </a:lstStyle>
           <a:p>
             <a:r>
-              <a:rPr lang="en-US" smtClean="0"/>
+              <a:rPr lang="en-US"/>
               <a:t>Click to edit Master title style</a:t>
             </a:r>
-            <a:endParaRPr lang="en-US"/>
           </a:p>
         </p:txBody>
       </p:sp>
@@ -233,10 +232,9 @@
           </a:lstStyle>
           <a:p>
             <a:r>
-              <a:rPr lang="en-US" smtClean="0"/>
+              <a:rPr lang="en-US"/>
               <a:t>Click to edit Master subtitle style</a:t>
             </a:r>
-            <a:endParaRPr lang="en-US"/>
           </a:p>
         </p:txBody>
       </p:sp>
@@ -257,7 +255,7 @@
           <a:p>
             <a:fld id="{BB7DCC67-5970-4D38-BCD6-A5FE23A66C8D}" type="datetimeFigureOut">
               <a:rPr lang="en-US" smtClean="0"/>
-              <a:t>8/24/16</a:t>
+              <a:t>5/5/18</a:t>
             </a:fld>
             <a:endParaRPr lang="en-US"/>
           </a:p>
@@ -351,10 +349,9 @@
           <a:lstStyle/>
           <a:p>
             <a:r>
-              <a:rPr lang="en-US" smtClean="0"/>
+              <a:rPr lang="en-US"/>
               <a:t>Click to edit Master title style</a:t>
             </a:r>
-            <a:endParaRPr lang="en-US"/>
           </a:p>
         </p:txBody>
       </p:sp>
@@ -375,38 +372,37 @@
           <a:p>
             <a:pPr lvl="0"/>
             <a:r>
-              <a:rPr lang="en-US" smtClean="0"/>
+              <a:rPr lang="en-US"/>
               <a:t>Click to edit Master text styles</a:t>
             </a:r>
           </a:p>
           <a:p>
             <a:pPr lvl="1"/>
             <a:r>
-              <a:rPr lang="en-US" smtClean="0"/>
+              <a:rPr lang="en-US"/>
               <a:t>Second level</a:t>
             </a:r>
           </a:p>
           <a:p>
             <a:pPr lvl="2"/>
             <a:r>
-              <a:rPr lang="en-US" smtClean="0"/>
+              <a:rPr lang="en-US"/>
               <a:t>Third level</a:t>
             </a:r>
           </a:p>
           <a:p>
             <a:pPr lvl="3"/>
             <a:r>
-              <a:rPr lang="en-US" smtClean="0"/>
+              <a:rPr lang="en-US"/>
               <a:t>Fourth level</a:t>
             </a:r>
           </a:p>
           <a:p>
             <a:pPr lvl="4"/>
             <a:r>
-              <a:rPr lang="en-US" smtClean="0"/>
+              <a:rPr lang="en-US"/>
               <a:t>Fifth level</a:t>
             </a:r>
-            <a:endParaRPr lang="en-US"/>
           </a:p>
         </p:txBody>
       </p:sp>
@@ -427,7 +423,7 @@
           <a:p>
             <a:fld id="{BB7DCC67-5970-4D38-BCD6-A5FE23A66C8D}" type="datetimeFigureOut">
               <a:rPr lang="en-US" smtClean="0"/>
-              <a:t>8/24/16</a:t>
+              <a:t>5/5/18</a:t>
             </a:fld>
             <a:endParaRPr lang="en-US"/>
           </a:p>
@@ -526,10 +522,9 @@
           <a:lstStyle/>
           <a:p>
             <a:r>
-              <a:rPr lang="en-US" smtClean="0"/>
+              <a:rPr lang="en-US"/>
               <a:t>Click to edit Master title style</a:t>
             </a:r>
-            <a:endParaRPr lang="en-US"/>
           </a:p>
         </p:txBody>
       </p:sp>
@@ -555,38 +550,37 @@
           <a:p>
             <a:pPr lvl="0"/>
             <a:r>
-              <a:rPr lang="en-US" smtClean="0"/>
+              <a:rPr lang="en-US"/>
               <a:t>Click to edit Master text styles</a:t>
             </a:r>
           </a:p>
           <a:p>
             <a:pPr lvl="1"/>
             <a:r>
-              <a:rPr lang="en-US" smtClean="0"/>
+              <a:rPr lang="en-US"/>
               <a:t>Second level</a:t>
             </a:r>
           </a:p>
           <a:p>
             <a:pPr lvl="2"/>
             <a:r>
-              <a:rPr lang="en-US" smtClean="0"/>
+              <a:rPr lang="en-US"/>
               <a:t>Third level</a:t>
             </a:r>
           </a:p>
           <a:p>
             <a:pPr lvl="3"/>
             <a:r>
-              <a:rPr lang="en-US" smtClean="0"/>
+              <a:rPr lang="en-US"/>
               <a:t>Fourth level</a:t>
             </a:r>
           </a:p>
           <a:p>
             <a:pPr lvl="4"/>
             <a:r>
-              <a:rPr lang="en-US" smtClean="0"/>
+              <a:rPr lang="en-US"/>
               <a:t>Fifth level</a:t>
             </a:r>
-            <a:endParaRPr lang="en-US"/>
           </a:p>
         </p:txBody>
       </p:sp>
@@ -607,7 +601,7 @@
           <a:p>
             <a:fld id="{BB7DCC67-5970-4D38-BCD6-A5FE23A66C8D}" type="datetimeFigureOut">
               <a:rPr lang="en-US" smtClean="0"/>
-              <a:t>8/24/16</a:t>
+              <a:t>5/5/18</a:t>
             </a:fld>
             <a:endParaRPr lang="en-US"/>
           </a:p>
@@ -701,10 +695,9 @@
           <a:lstStyle/>
           <a:p>
             <a:r>
-              <a:rPr lang="en-US" smtClean="0"/>
+              <a:rPr lang="en-US"/>
               <a:t>Click to edit Master title style</a:t>
             </a:r>
-            <a:endParaRPr lang="en-US"/>
           </a:p>
         </p:txBody>
       </p:sp>
@@ -725,38 +718,37 @@
           <a:p>
             <a:pPr lvl="0"/>
             <a:r>
-              <a:rPr lang="en-US" smtClean="0"/>
+              <a:rPr lang="en-US"/>
               <a:t>Click to edit Master text styles</a:t>
             </a:r>
           </a:p>
           <a:p>
             <a:pPr lvl="1"/>
             <a:r>
-              <a:rPr lang="en-US" smtClean="0"/>
+              <a:rPr lang="en-US"/>
               <a:t>Second level</a:t>
             </a:r>
           </a:p>
           <a:p>
             <a:pPr lvl="2"/>
             <a:r>
-              <a:rPr lang="en-US" smtClean="0"/>
+              <a:rPr lang="en-US"/>
               <a:t>Third level</a:t>
             </a:r>
           </a:p>
           <a:p>
             <a:pPr lvl="3"/>
             <a:r>
-              <a:rPr lang="en-US" smtClean="0"/>
+              <a:rPr lang="en-US"/>
               <a:t>Fourth level</a:t>
             </a:r>
           </a:p>
           <a:p>
             <a:pPr lvl="4"/>
             <a:r>
-              <a:rPr lang="en-US" smtClean="0"/>
+              <a:rPr lang="en-US"/>
               <a:t>Fifth level</a:t>
             </a:r>
-            <a:endParaRPr lang="en-US"/>
           </a:p>
         </p:txBody>
       </p:sp>
@@ -777,7 +769,7 @@
           <a:p>
             <a:fld id="{BB7DCC67-5970-4D38-BCD6-A5FE23A66C8D}" type="datetimeFigureOut">
               <a:rPr lang="en-US" smtClean="0"/>
-              <a:t>8/24/16</a:t>
+              <a:t>5/5/18</a:t>
             </a:fld>
             <a:endParaRPr lang="en-US"/>
           </a:p>
@@ -880,10 +872,9 @@
           </a:lstStyle>
           <a:p>
             <a:r>
-              <a:rPr lang="en-US" smtClean="0"/>
+              <a:rPr lang="en-US"/>
               <a:t>Click to edit Master title style</a:t>
             </a:r>
-            <a:endParaRPr lang="en-US"/>
           </a:p>
         </p:txBody>
       </p:sp>
@@ -1000,7 +991,7 @@
           <a:p>
             <a:pPr lvl="0"/>
             <a:r>
-              <a:rPr lang="en-US" smtClean="0"/>
+              <a:rPr lang="en-US"/>
               <a:t>Click to edit Master text styles</a:t>
             </a:r>
           </a:p>
@@ -1023,7 +1014,7 @@
           <a:p>
             <a:fld id="{BB7DCC67-5970-4D38-BCD6-A5FE23A66C8D}" type="datetimeFigureOut">
               <a:rPr lang="en-US" smtClean="0"/>
-              <a:t>8/24/16</a:t>
+              <a:t>5/5/18</a:t>
             </a:fld>
             <a:endParaRPr lang="en-US"/>
           </a:p>
@@ -1117,10 +1108,9 @@
           <a:lstStyle/>
           <a:p>
             <a:r>
-              <a:rPr lang="en-US" smtClean="0"/>
+              <a:rPr lang="en-US"/>
               <a:t>Click to edit Master title style</a:t>
             </a:r>
-            <a:endParaRPr lang="en-US"/>
           </a:p>
         </p:txBody>
       </p:sp>
@@ -1146,38 +1136,37 @@
           <a:p>
             <a:pPr lvl="0"/>
             <a:r>
-              <a:rPr lang="en-US" smtClean="0"/>
+              <a:rPr lang="en-US"/>
               <a:t>Click to edit Master text styles</a:t>
             </a:r>
           </a:p>
           <a:p>
             <a:pPr lvl="1"/>
             <a:r>
-              <a:rPr lang="en-US" smtClean="0"/>
+              <a:rPr lang="en-US"/>
               <a:t>Second level</a:t>
             </a:r>
           </a:p>
           <a:p>
             <a:pPr lvl="2"/>
             <a:r>
-              <a:rPr lang="en-US" smtClean="0"/>
+              <a:rPr lang="en-US"/>
               <a:t>Third level</a:t>
             </a:r>
           </a:p>
           <a:p>
             <a:pPr lvl="3"/>
             <a:r>
-              <a:rPr lang="en-US" smtClean="0"/>
+              <a:rPr lang="en-US"/>
               <a:t>Fourth level</a:t>
             </a:r>
           </a:p>
           <a:p>
             <a:pPr lvl="4"/>
             <a:r>
-              <a:rPr lang="en-US" smtClean="0"/>
+              <a:rPr lang="en-US"/>
               <a:t>Fifth level</a:t>
             </a:r>
-            <a:endParaRPr lang="en-US"/>
           </a:p>
         </p:txBody>
       </p:sp>
@@ -1203,38 +1192,37 @@
           <a:p>
             <a:pPr lvl="0"/>
             <a:r>
-              <a:rPr lang="en-US" smtClean="0"/>
+              <a:rPr lang="en-US"/>
               <a:t>Click to edit Master text styles</a:t>
             </a:r>
           </a:p>
           <a:p>
             <a:pPr lvl="1"/>
             <a:r>
-              <a:rPr lang="en-US" smtClean="0"/>
+              <a:rPr lang="en-US"/>
               <a:t>Second level</a:t>
             </a:r>
           </a:p>
           <a:p>
             <a:pPr lvl="2"/>
             <a:r>
-              <a:rPr lang="en-US" smtClean="0"/>
+              <a:rPr lang="en-US"/>
               <a:t>Third level</a:t>
             </a:r>
           </a:p>
           <a:p>
             <a:pPr lvl="3"/>
             <a:r>
-              <a:rPr lang="en-US" smtClean="0"/>
+              <a:rPr lang="en-US"/>
               <a:t>Fourth level</a:t>
             </a:r>
           </a:p>
           <a:p>
             <a:pPr lvl="4"/>
             <a:r>
-              <a:rPr lang="en-US" smtClean="0"/>
+              <a:rPr lang="en-US"/>
               <a:t>Fifth level</a:t>
             </a:r>
-            <a:endParaRPr lang="en-US"/>
           </a:p>
         </p:txBody>
       </p:sp>
@@ -1255,7 +1243,7 @@
           <a:p>
             <a:fld id="{BB7DCC67-5970-4D38-BCD6-A5FE23A66C8D}" type="datetimeFigureOut">
               <a:rPr lang="en-US" smtClean="0"/>
-              <a:t>8/24/16</a:t>
+              <a:t>5/5/18</a:t>
             </a:fld>
             <a:endParaRPr lang="en-US"/>
           </a:p>
@@ -1354,10 +1342,9 @@
           <a:lstStyle/>
           <a:p>
             <a:r>
-              <a:rPr lang="en-US" smtClean="0"/>
+              <a:rPr lang="en-US"/>
               <a:t>Click to edit Master title style</a:t>
             </a:r>
-            <a:endParaRPr lang="en-US"/>
           </a:p>
         </p:txBody>
       </p:sp>
@@ -1420,7 +1407,7 @@
           <a:p>
             <a:pPr lvl="0"/>
             <a:r>
-              <a:rPr lang="en-US" smtClean="0"/>
+              <a:rPr lang="en-US"/>
               <a:t>Click to edit Master text styles</a:t>
             </a:r>
           </a:p>
@@ -1448,38 +1435,37 @@
           <a:p>
             <a:pPr lvl="0"/>
             <a:r>
-              <a:rPr lang="en-US" smtClean="0"/>
+              <a:rPr lang="en-US"/>
               <a:t>Click to edit Master text styles</a:t>
             </a:r>
           </a:p>
           <a:p>
             <a:pPr lvl="1"/>
             <a:r>
-              <a:rPr lang="en-US" smtClean="0"/>
+              <a:rPr lang="en-US"/>
               <a:t>Second level</a:t>
             </a:r>
           </a:p>
           <a:p>
             <a:pPr lvl="2"/>
             <a:r>
-              <a:rPr lang="en-US" smtClean="0"/>
+              <a:rPr lang="en-US"/>
               <a:t>Third level</a:t>
             </a:r>
           </a:p>
           <a:p>
             <a:pPr lvl="3"/>
             <a:r>
-              <a:rPr lang="en-US" smtClean="0"/>
+              <a:rPr lang="en-US"/>
               <a:t>Fourth level</a:t>
             </a:r>
           </a:p>
           <a:p>
             <a:pPr lvl="4"/>
             <a:r>
-              <a:rPr lang="en-US" smtClean="0"/>
+              <a:rPr lang="en-US"/>
               <a:t>Fifth level</a:t>
             </a:r>
-            <a:endParaRPr lang="en-US"/>
           </a:p>
         </p:txBody>
       </p:sp>
@@ -1542,7 +1528,7 @@
           <a:p>
             <a:pPr lvl="0"/>
             <a:r>
-              <a:rPr lang="en-US" smtClean="0"/>
+              <a:rPr lang="en-US"/>
               <a:t>Click to edit Master text styles</a:t>
             </a:r>
           </a:p>
@@ -1570,38 +1556,37 @@
           <a:p>
             <a:pPr lvl="0"/>
             <a:r>
-              <a:rPr lang="en-US" smtClean="0"/>
+              <a:rPr lang="en-US"/>
               <a:t>Click to edit Master text styles</a:t>
             </a:r>
           </a:p>
           <a:p>
             <a:pPr lvl="1"/>
             <a:r>
-              <a:rPr lang="en-US" smtClean="0"/>
+              <a:rPr lang="en-US"/>
               <a:t>Second level</a:t>
             </a:r>
           </a:p>
           <a:p>
             <a:pPr lvl="2"/>
             <a:r>
-              <a:rPr lang="en-US" smtClean="0"/>
+              <a:rPr lang="en-US"/>
               <a:t>Third level</a:t>
             </a:r>
           </a:p>
           <a:p>
             <a:pPr lvl="3"/>
             <a:r>
-              <a:rPr lang="en-US" smtClean="0"/>
+              <a:rPr lang="en-US"/>
               <a:t>Fourth level</a:t>
             </a:r>
           </a:p>
           <a:p>
             <a:pPr lvl="4"/>
             <a:r>
-              <a:rPr lang="en-US" smtClean="0"/>
+              <a:rPr lang="en-US"/>
               <a:t>Fifth level</a:t>
             </a:r>
-            <a:endParaRPr lang="en-US"/>
           </a:p>
         </p:txBody>
       </p:sp>
@@ -1622,7 +1607,7 @@
           <a:p>
             <a:fld id="{BB7DCC67-5970-4D38-BCD6-A5FE23A66C8D}" type="datetimeFigureOut">
               <a:rPr lang="en-US" smtClean="0"/>
-              <a:t>8/24/16</a:t>
+              <a:t>5/5/18</a:t>
             </a:fld>
             <a:endParaRPr lang="en-US"/>
           </a:p>
@@ -1716,10 +1701,9 @@
           <a:lstStyle/>
           <a:p>
             <a:r>
-              <a:rPr lang="en-US" smtClean="0"/>
+              <a:rPr lang="en-US"/>
               <a:t>Click to edit Master title style</a:t>
             </a:r>
-            <a:endParaRPr lang="en-US"/>
           </a:p>
         </p:txBody>
       </p:sp>
@@ -1740,7 +1724,7 @@
           <a:p>
             <a:fld id="{BB7DCC67-5970-4D38-BCD6-A5FE23A66C8D}" type="datetimeFigureOut">
               <a:rPr lang="en-US" smtClean="0"/>
-              <a:t>8/24/16</a:t>
+              <a:t>5/5/18</a:t>
             </a:fld>
             <a:endParaRPr lang="en-US"/>
           </a:p>
@@ -1835,7 +1819,7 @@
           <a:p>
             <a:fld id="{BB7DCC67-5970-4D38-BCD6-A5FE23A66C8D}" type="datetimeFigureOut">
               <a:rPr lang="en-US" smtClean="0"/>
-              <a:t>8/24/16</a:t>
+              <a:t>5/5/18</a:t>
             </a:fld>
             <a:endParaRPr lang="en-US"/>
           </a:p>
@@ -1938,10 +1922,9 @@
           </a:lstStyle>
           <a:p>
             <a:r>
-              <a:rPr lang="en-US" smtClean="0"/>
+              <a:rPr lang="en-US"/>
               <a:t>Click to edit Master title style</a:t>
             </a:r>
-            <a:endParaRPr lang="en-US"/>
           </a:p>
         </p:txBody>
       </p:sp>
@@ -1995,38 +1978,37 @@
           <a:p>
             <a:pPr lvl="0"/>
             <a:r>
-              <a:rPr lang="en-US" smtClean="0"/>
+              <a:rPr lang="en-US"/>
               <a:t>Click to edit Master text styles</a:t>
             </a:r>
           </a:p>
           <a:p>
             <a:pPr lvl="1"/>
             <a:r>
-              <a:rPr lang="en-US" smtClean="0"/>
+              <a:rPr lang="en-US"/>
               <a:t>Second level</a:t>
             </a:r>
           </a:p>
           <a:p>
             <a:pPr lvl="2"/>
             <a:r>
-              <a:rPr lang="en-US" smtClean="0"/>
+              <a:rPr lang="en-US"/>
               <a:t>Third level</a:t>
             </a:r>
           </a:p>
           <a:p>
             <a:pPr lvl="3"/>
             <a:r>
-              <a:rPr lang="en-US" smtClean="0"/>
+              <a:rPr lang="en-US"/>
               <a:t>Fourth level</a:t>
             </a:r>
           </a:p>
           <a:p>
             <a:pPr lvl="4"/>
             <a:r>
-              <a:rPr lang="en-US" smtClean="0"/>
+              <a:rPr lang="en-US"/>
               <a:t>Fifth level</a:t>
             </a:r>
-            <a:endParaRPr lang="en-US"/>
           </a:p>
         </p:txBody>
       </p:sp>
@@ -2089,7 +2071,7 @@
           <a:p>
             <a:pPr lvl="0"/>
             <a:r>
-              <a:rPr lang="en-US" smtClean="0"/>
+              <a:rPr lang="en-US"/>
               <a:t>Click to edit Master text styles</a:t>
             </a:r>
           </a:p>
@@ -2112,7 +2094,7 @@
           <a:p>
             <a:fld id="{BB7DCC67-5970-4D38-BCD6-A5FE23A66C8D}" type="datetimeFigureOut">
               <a:rPr lang="en-US" smtClean="0"/>
-              <a:t>8/24/16</a:t>
+              <a:t>5/5/18</a:t>
             </a:fld>
             <a:endParaRPr lang="en-US"/>
           </a:p>
@@ -2215,10 +2197,9 @@
           </a:lstStyle>
           <a:p>
             <a:r>
-              <a:rPr lang="en-US" smtClean="0"/>
+              <a:rPr lang="en-US"/>
               <a:t>Click to edit Master title style</a:t>
             </a:r>
-            <a:endParaRPr lang="en-US"/>
           </a:p>
         </p:txBody>
       </p:sp>
@@ -2342,7 +2323,7 @@
           <a:p>
             <a:pPr lvl="0"/>
             <a:r>
-              <a:rPr lang="en-US" smtClean="0"/>
+              <a:rPr lang="en-US"/>
               <a:t>Click to edit Master text styles</a:t>
             </a:r>
           </a:p>
@@ -2365,7 +2346,7 @@
           <a:p>
             <a:fld id="{BB7DCC67-5970-4D38-BCD6-A5FE23A66C8D}" type="datetimeFigureOut">
               <a:rPr lang="en-US" smtClean="0"/>
-              <a:t>8/24/16</a:t>
+              <a:t>5/5/18</a:t>
             </a:fld>
             <a:endParaRPr lang="en-US"/>
           </a:p>
@@ -2474,10 +2455,9 @@
           <a:lstStyle/>
           <a:p>
             <a:r>
-              <a:rPr lang="en-US" smtClean="0"/>
+              <a:rPr lang="en-US"/>
               <a:t>Click to edit Master title style</a:t>
             </a:r>
-            <a:endParaRPr lang="en-US"/>
           </a:p>
         </p:txBody>
       </p:sp>
@@ -2508,38 +2488,37 @@
           <a:p>
             <a:pPr lvl="0"/>
             <a:r>
-              <a:rPr lang="en-US" smtClean="0"/>
+              <a:rPr lang="en-US"/>
               <a:t>Click to edit Master text styles</a:t>
             </a:r>
           </a:p>
           <a:p>
             <a:pPr lvl="1"/>
             <a:r>
-              <a:rPr lang="en-US" smtClean="0"/>
+              <a:rPr lang="en-US"/>
               <a:t>Second level</a:t>
             </a:r>
           </a:p>
           <a:p>
             <a:pPr lvl="2"/>
             <a:r>
-              <a:rPr lang="en-US" smtClean="0"/>
+              <a:rPr lang="en-US"/>
               <a:t>Third level</a:t>
             </a:r>
           </a:p>
           <a:p>
             <a:pPr lvl="3"/>
             <a:r>
-              <a:rPr lang="en-US" smtClean="0"/>
+              <a:rPr lang="en-US"/>
               <a:t>Fourth level</a:t>
             </a:r>
           </a:p>
           <a:p>
             <a:pPr lvl="4"/>
             <a:r>
-              <a:rPr lang="en-US" smtClean="0"/>
+              <a:rPr lang="en-US"/>
               <a:t>Fifth level</a:t>
             </a:r>
-            <a:endParaRPr lang="en-US"/>
           </a:p>
         </p:txBody>
       </p:sp>
@@ -2578,7 +2557,7 @@
           <a:p>
             <a:fld id="{BB7DCC67-5970-4D38-BCD6-A5FE23A66C8D}" type="datetimeFigureOut">
               <a:rPr lang="en-US" smtClean="0"/>
-              <a:t>8/24/16</a:t>
+              <a:t>5/5/18</a:t>
             </a:fld>
             <a:endParaRPr lang="en-US"/>
           </a:p>
@@ -3026,18 +3005,13 @@
           <a:p>
             <a:pPr algn="ctr"/>
             <a:r>
-              <a:rPr lang="en-US" sz="2800" dirty="0" smtClean="0">
+              <a:rPr lang="en-US" sz="2800" dirty="0">
                 <a:solidFill>
                   <a:schemeClr val="tx1"/>
                 </a:solidFill>
               </a:rPr>
               <a:t>0</a:t>
             </a:r>
-            <a:endParaRPr lang="en-US" sz="2800" dirty="0">
-              <a:solidFill>
-                <a:schemeClr val="tx1"/>
-              </a:solidFill>
-            </a:endParaRPr>
           </a:p>
         </p:txBody>
       </p:sp>
@@ -3084,18 +3058,13 @@
           <a:p>
             <a:pPr algn="ctr"/>
             <a:r>
-              <a:rPr lang="en-US" sz="2800" dirty="0" smtClean="0">
+              <a:rPr lang="en-US" sz="2800" dirty="0">
                 <a:solidFill>
                   <a:schemeClr val="tx1"/>
                 </a:solidFill>
               </a:rPr>
               <a:t>1</a:t>
             </a:r>
-            <a:endParaRPr lang="en-US" sz="2800" dirty="0">
-              <a:solidFill>
-                <a:schemeClr val="tx1"/>
-              </a:solidFill>
-            </a:endParaRPr>
           </a:p>
         </p:txBody>
       </p:sp>
@@ -3142,18 +3111,13 @@
           <a:p>
             <a:pPr algn="ctr"/>
             <a:r>
-              <a:rPr lang="en-US" sz="2800" dirty="0" smtClean="0">
+              <a:rPr lang="en-US" sz="2800" dirty="0">
                 <a:solidFill>
                   <a:schemeClr val="tx1"/>
                 </a:solidFill>
               </a:rPr>
               <a:t>3</a:t>
             </a:r>
-            <a:endParaRPr lang="en-US" sz="2800" dirty="0">
-              <a:solidFill>
-                <a:schemeClr val="tx1"/>
-              </a:solidFill>
-            </a:endParaRPr>
           </a:p>
         </p:txBody>
       </p:sp>
@@ -3200,18 +3164,13 @@
           <a:p>
             <a:pPr algn="ctr"/>
             <a:r>
-              <a:rPr lang="en-US" sz="2800" dirty="0" smtClean="0">
+              <a:rPr lang="en-US" sz="2800" dirty="0">
                 <a:solidFill>
                   <a:schemeClr val="tx1"/>
                 </a:solidFill>
               </a:rPr>
               <a:t>4</a:t>
             </a:r>
-            <a:endParaRPr lang="en-US" sz="2800" dirty="0">
-              <a:solidFill>
-                <a:schemeClr val="tx1"/>
-              </a:solidFill>
-            </a:endParaRPr>
           </a:p>
         </p:txBody>
       </p:sp>
@@ -3375,7 +3334,7 @@
           <a:p>
             <a:pPr algn="ctr"/>
             <a:r>
-              <a:rPr lang="en-US" sz="2800" smtClean="0">
+              <a:rPr lang="en-US" sz="2800">
                 <a:solidFill>
                   <a:schemeClr val="tx1"/>
                 </a:solidFill>
@@ -4688,18 +4647,13 @@
           <a:p>
             <a:pPr algn="ctr"/>
             <a:r>
-              <a:rPr lang="en-US" sz="2800" dirty="0" smtClean="0">
+              <a:rPr lang="en-US" sz="2800" dirty="0">
                 <a:solidFill>
                   <a:schemeClr val="tx1"/>
                 </a:solidFill>
               </a:rPr>
               <a:t>j</a:t>
             </a:r>
-            <a:endParaRPr lang="en-US" sz="2800" dirty="0">
-              <a:solidFill>
-                <a:schemeClr val="tx1"/>
-              </a:solidFill>
-            </a:endParaRPr>
           </a:p>
         </p:txBody>
       </p:sp>
@@ -5277,7 +5231,7 @@
                   <a:schemeClr val="tx1"/>
                 </a:solidFill>
               </a:rPr>
-              <a:t>8</a:t>
+              <a:t>7</a:t>
             </a:r>
           </a:p>
         </p:txBody>
@@ -5698,7 +5652,7 @@
                   <a:schemeClr val="tx1"/>
                 </a:solidFill>
               </a:rPr>
-              <a:t>7</a:t>
+              <a:t>8</a:t>
             </a:r>
           </a:p>
         </p:txBody>
@@ -5785,18 +5739,13 @@
           <a:p>
             <a:pPr algn="ctr"/>
             <a:r>
-              <a:rPr lang="en-US" sz="2400" dirty="0" smtClean="0">
+              <a:rPr lang="en-US" sz="2400" dirty="0">
                 <a:solidFill>
                   <a:schemeClr val="tx1"/>
                 </a:solidFill>
               </a:rPr>
               <a:t>10</a:t>
             </a:r>
-            <a:endParaRPr lang="en-US" sz="2400" dirty="0">
-              <a:solidFill>
-                <a:schemeClr val="tx1"/>
-              </a:solidFill>
-            </a:endParaRPr>
           </a:p>
         </p:txBody>
       </p:sp>

</xml_diff>